<commit_message>
Revert "Merge branch 'compete_snowflake_jose'"
This reverts commit aebe1be18e35a1d0f298c36d05d023aef0400374, reversing
changes made to fa5ec95768e4f0429c6691f99650d69fd008a3c5.
</commit_message>
<xml_diff>
--- a/filesets/compete_snowflake/snowflake_migration_blockers.pptx
+++ b/filesets/compete_snowflake/snowflake_migration_blockers.pptx
@@ -220,7 +220,7 @@
           <a:p>
             <a:fld id="{C7103FDF-5845-2441-8890-D723FF5A85D0}" type="datetimeFigureOut">
               <a:rPr lang="en-US" smtClean="0"/>
-              <a:t>8/10/2020</a:t>
+              <a:t>25-Jun-20</a:t>
             </a:fld>
             <a:endParaRPr lang="en-US"/>
           </a:p>
@@ -31342,10 +31342,10 @@
         </p:nvGrpSpPr>
         <p:grpSpPr>
           <a:xfrm>
-            <a:off x="47329" y="1840169"/>
-            <a:ext cx="2981356" cy="795497"/>
-            <a:chOff x="16712" y="1646497"/>
-            <a:chExt cx="2981356" cy="795497"/>
+            <a:off x="843079" y="1840169"/>
+            <a:ext cx="2185605" cy="610831"/>
+            <a:chOff x="812462" y="1646497"/>
+            <a:chExt cx="2185605" cy="610831"/>
           </a:xfrm>
         </p:grpSpPr>
         <p:sp>
@@ -31362,8 +31362,8 @@
           </p:nvSpPr>
           <p:spPr>
             <a:xfrm>
-              <a:off x="16712" y="1980329"/>
-              <a:ext cx="2981356" cy="461665"/>
+              <a:off x="812462" y="1980329"/>
+              <a:ext cx="2185605" cy="276999"/>
             </a:xfrm>
             <a:prstGeom prst="rect">
               <a:avLst/>
@@ -31377,18 +31377,6 @@
             <a:lstStyle/>
             <a:p>
               <a:r>
-                <a:rPr lang="en-US" sz="1200" dirty="0"/>
-                <a:t>{{</a:t>
-              </a:r>
-              <a:r>
-                <a:rPr lang="en-US" sz="1200" dirty="0" err="1"/>
-                <a:t>val:dat_index_count_for_pptx.csv</a:t>
-              </a:r>
-              <a:r>
-                <a:rPr lang="en-US" sz="1200" dirty="0"/>
-                <a:t>[1:3]}}</a:t>
-              </a:r>
-              <a:r>
                 <a:rPr lang="en-IN" sz="1200" dirty="0">
                   <a:solidFill>
                     <a:schemeClr val="tx2"/>
@@ -31396,7 +31384,7 @@
                   <a:latin typeface="Arial" pitchFamily="34" charset="0"/>
                   <a:cs typeface="Arial" pitchFamily="34" charset="0"/>
                 </a:rPr>
-                <a:t> UPI Defined</a:t>
+                <a:t>36,784 UPI Defined</a:t>
               </a:r>
             </a:p>
           </p:txBody>
@@ -32744,7 +32732,7 @@
             </a:ln>
             <a:extLst>
               <a:ext uri="{91240B29-F687-4f45-9708-019B960494DF}">
-                <a14:hiddenLine xmlns:a14="http://schemas.microsoft.com/office/drawing/2010/main" xmlns="" w="9525">
+                <a14:hiddenLine xmlns="" xmlns:a14="http://schemas.microsoft.com/office/drawing/2010/main" w="9525">
                   <a:solidFill>
                     <a:srgbClr val="000000"/>
                   </a:solidFill>
@@ -32796,7 +32784,7 @@
             </a:ln>
             <a:extLst>
               <a:ext uri="{91240B29-F687-4f45-9708-019B960494DF}">
-                <a14:hiddenLine xmlns:a14="http://schemas.microsoft.com/office/drawing/2010/main" xmlns="" w="9525">
+                <a14:hiddenLine xmlns="" xmlns:a14="http://schemas.microsoft.com/office/drawing/2010/main" w="9525">
                   <a:solidFill>
                     <a:srgbClr val="000000"/>
                   </a:solidFill>
@@ -32848,7 +32836,7 @@
             </a:ln>
             <a:extLst>
               <a:ext uri="{91240B29-F687-4f45-9708-019B960494DF}">
-                <a14:hiddenLine xmlns:a14="http://schemas.microsoft.com/office/drawing/2010/main" xmlns="" w="9525">
+                <a14:hiddenLine xmlns="" xmlns:a14="http://schemas.microsoft.com/office/drawing/2010/main" w="9525">
                   <a:solidFill>
                     <a:srgbClr val="000000"/>
                   </a:solidFill>
@@ -32900,7 +32888,7 @@
             </a:ln>
             <a:extLst>
               <a:ext uri="{91240B29-F687-4f45-9708-019B960494DF}">
-                <a14:hiddenLine xmlns:a14="http://schemas.microsoft.com/office/drawing/2010/main" xmlns="" w="9525">
+                <a14:hiddenLine xmlns="" xmlns:a14="http://schemas.microsoft.com/office/drawing/2010/main" w="9525">
                   <a:solidFill>
                     <a:srgbClr val="000000"/>
                   </a:solidFill>
@@ -33353,7 +33341,7 @@
             </a:ln>
             <a:extLst>
               <a:ext uri="{91240B29-F687-4f45-9708-019B960494DF}">
-                <a14:hiddenLine xmlns:a14="http://schemas.microsoft.com/office/drawing/2010/main" xmlns="" w="9525">
+                <a14:hiddenLine xmlns="" xmlns:a14="http://schemas.microsoft.com/office/drawing/2010/main" w="9525">
                   <a:solidFill>
                     <a:srgbClr val="000000"/>
                   </a:solidFill>
@@ -33603,7 +33591,7 @@
             </a:ln>
             <a:extLst>
               <a:ext uri="{91240B29-F687-4f45-9708-019B960494DF}">
-                <a14:hiddenLine xmlns:a14="http://schemas.microsoft.com/office/drawing/2010/main" xmlns="" w="9525">
+                <a14:hiddenLine xmlns="" xmlns:a14="http://schemas.microsoft.com/office/drawing/2010/main" w="9525">
                   <a:solidFill>
                     <a:srgbClr val="000000"/>
                   </a:solidFill>
@@ -34081,7 +34069,7 @@
             </a:ln>
             <a:extLst>
               <a:ext uri="{91240B29-F687-4f45-9708-019B960494DF}">
-                <a14:hiddenLine xmlns:a14="http://schemas.microsoft.com/office/drawing/2010/main" xmlns="" w="9525">
+                <a14:hiddenLine xmlns="" xmlns:a14="http://schemas.microsoft.com/office/drawing/2010/main" w="9525">
                   <a:solidFill>
                     <a:srgbClr val="000000"/>
                   </a:solidFill>
@@ -36074,7 +36062,7 @@
             </a:ln>
             <a:extLst>
               <a:ext uri="{91240B29-F687-4f45-9708-019B960494DF}">
-                <a14:hiddenLine xmlns:a14="http://schemas.microsoft.com/office/drawing/2010/main" xmlns="" w="9525">
+                <a14:hiddenLine xmlns="" xmlns:a14="http://schemas.microsoft.com/office/drawing/2010/main" w="9525">
                   <a:solidFill>
                     <a:srgbClr val="000000"/>
                   </a:solidFill>
@@ -36304,7 +36292,7 @@
             </a:ln>
             <a:extLst>
               <a:ext uri="{91240B29-F687-4f45-9708-019B960494DF}">
-                <a14:hiddenLine xmlns:a14="http://schemas.microsoft.com/office/drawing/2010/main" xmlns="" w="9525">
+                <a14:hiddenLine xmlns="" xmlns:a14="http://schemas.microsoft.com/office/drawing/2010/main" w="9525">
                   <a:solidFill>
                     <a:srgbClr val="000000"/>
                   </a:solidFill>
@@ -36414,7 +36402,7 @@
             </a:ln>
             <a:extLst>
               <a:ext uri="{91240B29-F687-4f45-9708-019B960494DF}">
-                <a14:hiddenLine xmlns:a14="http://schemas.microsoft.com/office/drawing/2010/main" xmlns="" w="9525">
+                <a14:hiddenLine xmlns="" xmlns:a14="http://schemas.microsoft.com/office/drawing/2010/main" w="9525">
                   <a:solidFill>
                     <a:srgbClr val="000000"/>
                   </a:solidFill>
@@ -36651,7 +36639,7 @@
             </a:ln>
             <a:extLst>
               <a:ext uri="{91240B29-F687-4f45-9708-019B960494DF}">
-                <a14:hiddenLine xmlns:a14="http://schemas.microsoft.com/office/drawing/2010/main" xmlns="" w="9525">
+                <a14:hiddenLine xmlns="" xmlns:a14="http://schemas.microsoft.com/office/drawing/2010/main" w="9525">
                   <a:solidFill>
                     <a:srgbClr val="000000"/>
                   </a:solidFill>
@@ -37274,7 +37262,7 @@
             </a:ln>
             <a:extLst>
               <a:ext uri="{91240B29-F687-4f45-9708-019B960494DF}">
-                <a14:hiddenLine xmlns:a14="http://schemas.microsoft.com/office/drawing/2010/main" xmlns="" w="9525">
+                <a14:hiddenLine xmlns="" xmlns:a14="http://schemas.microsoft.com/office/drawing/2010/main" w="9525">
                   <a:solidFill>
                     <a:srgbClr val="000000"/>
                   </a:solidFill>
@@ -37873,7 +37861,7 @@
             </a:ln>
             <a:extLst>
               <a:ext uri="{91240B29-F687-4f45-9708-019B960494DF}">
-                <a14:hiddenLine xmlns:a14="http://schemas.microsoft.com/office/drawing/2010/main" xmlns="" w="9525">
+                <a14:hiddenLine xmlns="" xmlns:a14="http://schemas.microsoft.com/office/drawing/2010/main" w="9525">
                   <a:solidFill>
                     <a:srgbClr val="000000"/>
                   </a:solidFill>
@@ -38472,7 +38460,7 @@
             </a:ln>
             <a:extLst>
               <a:ext uri="{91240B29-F687-4f45-9708-019B960494DF}">
-                <a14:hiddenLine xmlns:a14="http://schemas.microsoft.com/office/drawing/2010/main" xmlns="" w="9525">
+                <a14:hiddenLine xmlns="" xmlns:a14="http://schemas.microsoft.com/office/drawing/2010/main" w="9525">
                   <a:solidFill>
                     <a:srgbClr val="000000"/>
                   </a:solidFill>
@@ -38496,219 +38484,6 @@
           </p:txBody>
         </p:sp>
       </p:grpSp>
-      <p:sp>
-        <p:nvSpPr>
-          <p:cNvPr id="71" name="Content Placeholder 1" descr="/*{{values:birthday.csv}}*/">
-            <a:extLst>
-              <a:ext uri="{FF2B5EF4-FFF2-40B4-BE49-F238E27FC236}">
-                <a16:creationId xmlns:a16="http://schemas.microsoft.com/office/drawing/2014/main" id="{B497C003-FF04-4227-B6D2-23AA6908B6B1}"/>
-              </a:ext>
-            </a:extLst>
-          </p:cNvPr>
-          <p:cNvSpPr txBox="1">
-            <a:spLocks/>
-          </p:cNvSpPr>
-          <p:nvPr/>
-        </p:nvSpPr>
-        <p:spPr>
-          <a:xfrm>
-            <a:off x="335360" y="1196752"/>
-            <a:ext cx="10409902" cy="546868"/>
-          </a:xfrm>
-          <a:prstGeom prst="rect">
-            <a:avLst/>
-          </a:prstGeom>
-        </p:spPr>
-        <p:txBody>
-          <a:bodyPr/>
-          <a:lstStyle>
-            <a:lvl1pPr marL="234950" indent="-234950" algn="l" defTabSz="914400" rtl="0" eaLnBrk="1" latinLnBrk="0" hangingPunct="1">
-              <a:lnSpc>
-                <a:spcPct val="120000"/>
-              </a:lnSpc>
-              <a:spcBef>
-                <a:spcPts val="1000"/>
-              </a:spcBef>
-              <a:buFont typeface="Arial" panose="020B0604020202020204" pitchFamily="34" charset="0"/>
-              <a:buChar char="•"/>
-              <a:tabLst/>
-              <a:defRPr sz="2100" kern="1200">
-                <a:solidFill>
-                  <a:schemeClr val="tx1"/>
-                </a:solidFill>
-                <a:latin typeface="+mn-lt"/>
-                <a:ea typeface="+mn-ea"/>
-                <a:cs typeface="+mn-cs"/>
-              </a:defRPr>
-            </a:lvl1pPr>
-            <a:lvl2pPr marL="577850" indent="-223838" algn="l" defTabSz="914400" rtl="0" eaLnBrk="1" latinLnBrk="0" hangingPunct="1">
-              <a:lnSpc>
-                <a:spcPct val="100000"/>
-              </a:lnSpc>
-              <a:spcBef>
-                <a:spcPts val="500"/>
-              </a:spcBef>
-              <a:buFont typeface="Arial" panose="020B0604020202020204" pitchFamily="34" charset="0"/>
-              <a:buChar char="•"/>
-              <a:tabLst/>
-              <a:defRPr sz="1900" kern="1200">
-                <a:solidFill>
-                  <a:schemeClr val="tx1"/>
-                </a:solidFill>
-                <a:latin typeface="+mn-lt"/>
-                <a:ea typeface="+mn-ea"/>
-                <a:cs typeface="+mn-cs"/>
-              </a:defRPr>
-            </a:lvl2pPr>
-            <a:lvl3pPr marL="914400" indent="-233363" algn="l" defTabSz="914400" rtl="0" eaLnBrk="1" latinLnBrk="0" hangingPunct="1">
-              <a:lnSpc>
-                <a:spcPct val="90000"/>
-              </a:lnSpc>
-              <a:spcBef>
-                <a:spcPts val="500"/>
-              </a:spcBef>
-              <a:buFont typeface="Arial" panose="020B0604020202020204" pitchFamily="34" charset="0"/>
-              <a:buChar char="•"/>
-              <a:tabLst/>
-              <a:defRPr sz="1700" kern="1200">
-                <a:solidFill>
-                  <a:schemeClr val="tx1"/>
-                </a:solidFill>
-                <a:latin typeface="+mn-lt"/>
-                <a:ea typeface="+mn-ea"/>
-                <a:cs typeface="+mn-cs"/>
-              </a:defRPr>
-            </a:lvl3pPr>
-            <a:lvl4pPr marL="1260475" indent="-233363" algn="l" defTabSz="914400" rtl="0" eaLnBrk="1" latinLnBrk="0" hangingPunct="1">
-              <a:lnSpc>
-                <a:spcPct val="90000"/>
-              </a:lnSpc>
-              <a:spcBef>
-                <a:spcPts val="500"/>
-              </a:spcBef>
-              <a:buFont typeface="Arial" panose="020B0604020202020204" pitchFamily="34" charset="0"/>
-              <a:buChar char="•"/>
-              <a:tabLst/>
-              <a:defRPr sz="1700" kern="1200">
-                <a:solidFill>
-                  <a:schemeClr val="tx1"/>
-                </a:solidFill>
-                <a:latin typeface="+mn-lt"/>
-                <a:ea typeface="+mn-ea"/>
-                <a:cs typeface="+mn-cs"/>
-              </a:defRPr>
-            </a:lvl4pPr>
-            <a:lvl5pPr marL="1603375" indent="-222250" algn="l" defTabSz="914400" rtl="0" eaLnBrk="1" latinLnBrk="0" hangingPunct="1">
-              <a:lnSpc>
-                <a:spcPct val="90000"/>
-              </a:lnSpc>
-              <a:spcBef>
-                <a:spcPts val="500"/>
-              </a:spcBef>
-              <a:buFont typeface="Arial" panose="020B0604020202020204" pitchFamily="34" charset="0"/>
-              <a:buChar char="•"/>
-              <a:tabLst/>
-              <a:defRPr sz="1700" kern="1200">
-                <a:solidFill>
-                  <a:schemeClr val="tx1"/>
-                </a:solidFill>
-                <a:latin typeface="+mn-lt"/>
-                <a:ea typeface="+mn-ea"/>
-                <a:cs typeface="+mn-cs"/>
-              </a:defRPr>
-            </a:lvl5pPr>
-            <a:lvl6pPr marL="2514600" indent="-228600" algn="l" defTabSz="914400" rtl="0" eaLnBrk="1" latinLnBrk="0" hangingPunct="1">
-              <a:lnSpc>
-                <a:spcPct val="90000"/>
-              </a:lnSpc>
-              <a:spcBef>
-                <a:spcPts val="500"/>
-              </a:spcBef>
-              <a:buFont typeface="Arial" panose="020B0604020202020204" pitchFamily="34" charset="0"/>
-              <a:buChar char="•"/>
-              <a:defRPr sz="1800" kern="1200">
-                <a:solidFill>
-                  <a:schemeClr val="tx1"/>
-                </a:solidFill>
-                <a:latin typeface="+mn-lt"/>
-                <a:ea typeface="+mn-ea"/>
-                <a:cs typeface="+mn-cs"/>
-              </a:defRPr>
-            </a:lvl6pPr>
-            <a:lvl7pPr marL="2971800" indent="-228600" algn="l" defTabSz="914400" rtl="0" eaLnBrk="1" latinLnBrk="0" hangingPunct="1">
-              <a:lnSpc>
-                <a:spcPct val="90000"/>
-              </a:lnSpc>
-              <a:spcBef>
-                <a:spcPts val="500"/>
-              </a:spcBef>
-              <a:buFont typeface="Arial" panose="020B0604020202020204" pitchFamily="34" charset="0"/>
-              <a:buChar char="•"/>
-              <a:defRPr sz="1800" kern="1200">
-                <a:solidFill>
-                  <a:schemeClr val="tx1"/>
-                </a:solidFill>
-                <a:latin typeface="+mn-lt"/>
-                <a:ea typeface="+mn-ea"/>
-                <a:cs typeface="+mn-cs"/>
-              </a:defRPr>
-            </a:lvl7pPr>
-            <a:lvl8pPr marL="3429000" indent="-228600" algn="l" defTabSz="914400" rtl="0" eaLnBrk="1" latinLnBrk="0" hangingPunct="1">
-              <a:lnSpc>
-                <a:spcPct val="90000"/>
-              </a:lnSpc>
-              <a:spcBef>
-                <a:spcPts val="500"/>
-              </a:spcBef>
-              <a:buFont typeface="Arial" panose="020B0604020202020204" pitchFamily="34" charset="0"/>
-              <a:buChar char="•"/>
-              <a:defRPr sz="1800" kern="1200">
-                <a:solidFill>
-                  <a:schemeClr val="tx1"/>
-                </a:solidFill>
-                <a:latin typeface="+mn-lt"/>
-                <a:ea typeface="+mn-ea"/>
-                <a:cs typeface="+mn-cs"/>
-              </a:defRPr>
-            </a:lvl8pPr>
-            <a:lvl9pPr marL="3886200" indent="-228600" algn="l" defTabSz="914400" rtl="0" eaLnBrk="1" latinLnBrk="0" hangingPunct="1">
-              <a:lnSpc>
-                <a:spcPct val="90000"/>
-              </a:lnSpc>
-              <a:spcBef>
-                <a:spcPts val="500"/>
-              </a:spcBef>
-              <a:buFont typeface="Arial" panose="020B0604020202020204" pitchFamily="34" charset="0"/>
-              <a:buChar char="•"/>
-              <a:defRPr sz="1800" kern="1200">
-                <a:solidFill>
-                  <a:schemeClr val="tx1"/>
-                </a:solidFill>
-                <a:latin typeface="+mn-lt"/>
-                <a:ea typeface="+mn-ea"/>
-                <a:cs typeface="+mn-cs"/>
-              </a:defRPr>
-            </a:lvl9pPr>
-          </a:lstStyle>
-          <a:p>
-            <a:pPr marL="0" indent="0">
-              <a:buNone/>
-            </a:pPr>
-            <a:r>
-              <a:rPr lang="en-US" dirty="0"/>
-              <a:t>If my birthday is {{</a:t>
-            </a:r>
-            <a:r>
-              <a:rPr lang="en-US" dirty="0" err="1"/>
-              <a:t>val:dat_index_count_for_pptx.csv</a:t>
-            </a:r>
-            <a:r>
-              <a:rPr lang="en-US" dirty="0"/>
-              <a:t>[2:3]}}</a:t>
-            </a:r>
-          </a:p>
-        </p:txBody>
-      </p:sp>
     </p:spTree>
     <p:extLst>
       <p:ext uri="{BB962C8B-B14F-4D97-AF65-F5344CB8AC3E}">
@@ -47223,7 +46998,7 @@
             </a:ln>
             <a:extLst>
               <a:ext uri="{91240B29-F687-4f45-9708-019B960494DF}">
-                <a14:hiddenLine xmlns:a14="http://schemas.microsoft.com/office/drawing/2010/main" xmlns="" w="9525">
+                <a14:hiddenLine xmlns="" xmlns:a14="http://schemas.microsoft.com/office/drawing/2010/main" w="9525">
                   <a:solidFill>
                     <a:srgbClr val="000000"/>
                   </a:solidFill>
@@ -47275,7 +47050,7 @@
             </a:ln>
             <a:extLst>
               <a:ext uri="{91240B29-F687-4f45-9708-019B960494DF}">
-                <a14:hiddenLine xmlns:a14="http://schemas.microsoft.com/office/drawing/2010/main" xmlns="" w="9525">
+                <a14:hiddenLine xmlns="" xmlns:a14="http://schemas.microsoft.com/office/drawing/2010/main" w="9525">
                   <a:solidFill>
                     <a:srgbClr val="000000"/>
                   </a:solidFill>
@@ -47327,7 +47102,7 @@
             </a:ln>
             <a:extLst>
               <a:ext uri="{91240B29-F687-4f45-9708-019B960494DF}">
-                <a14:hiddenLine xmlns:a14="http://schemas.microsoft.com/office/drawing/2010/main" xmlns="" w="9525">
+                <a14:hiddenLine xmlns="" xmlns:a14="http://schemas.microsoft.com/office/drawing/2010/main" w="9525">
                   <a:solidFill>
                     <a:srgbClr val="000000"/>
                   </a:solidFill>
@@ -47379,7 +47154,7 @@
             </a:ln>
             <a:extLst>
               <a:ext uri="{91240B29-F687-4f45-9708-019B960494DF}">
-                <a14:hiddenLine xmlns:a14="http://schemas.microsoft.com/office/drawing/2010/main" xmlns="" w="9525">
+                <a14:hiddenLine xmlns="" xmlns:a14="http://schemas.microsoft.com/office/drawing/2010/main" w="9525">
                   <a:solidFill>
                     <a:srgbClr val="000000"/>
                   </a:solidFill>
@@ -47832,7 +47607,7 @@
             </a:ln>
             <a:extLst>
               <a:ext uri="{91240B29-F687-4f45-9708-019B960494DF}">
-                <a14:hiddenLine xmlns:a14="http://schemas.microsoft.com/office/drawing/2010/main" xmlns="" w="9525">
+                <a14:hiddenLine xmlns="" xmlns:a14="http://schemas.microsoft.com/office/drawing/2010/main" w="9525">
                   <a:solidFill>
                     <a:srgbClr val="000000"/>
                   </a:solidFill>
@@ -48082,7 +47857,7 @@
             </a:ln>
             <a:extLst>
               <a:ext uri="{91240B29-F687-4f45-9708-019B960494DF}">
-                <a14:hiddenLine xmlns:a14="http://schemas.microsoft.com/office/drawing/2010/main" xmlns="" w="9525">
+                <a14:hiddenLine xmlns="" xmlns:a14="http://schemas.microsoft.com/office/drawing/2010/main" w="9525">
                   <a:solidFill>
                     <a:srgbClr val="000000"/>
                   </a:solidFill>
@@ -48560,7 +48335,7 @@
             </a:ln>
             <a:extLst>
               <a:ext uri="{91240B29-F687-4f45-9708-019B960494DF}">
-                <a14:hiddenLine xmlns:a14="http://schemas.microsoft.com/office/drawing/2010/main" xmlns="" w="9525">
+                <a14:hiddenLine xmlns="" xmlns:a14="http://schemas.microsoft.com/office/drawing/2010/main" w="9525">
                   <a:solidFill>
                     <a:srgbClr val="000000"/>
                   </a:solidFill>
@@ -50553,7 +50328,7 @@
             </a:ln>
             <a:extLst>
               <a:ext uri="{91240B29-F687-4f45-9708-019B960494DF}">
-                <a14:hiddenLine xmlns:a14="http://schemas.microsoft.com/office/drawing/2010/main" xmlns="" w="9525">
+                <a14:hiddenLine xmlns="" xmlns:a14="http://schemas.microsoft.com/office/drawing/2010/main" w="9525">
                   <a:solidFill>
                     <a:srgbClr val="000000"/>
                   </a:solidFill>
@@ -50783,7 +50558,7 @@
             </a:ln>
             <a:extLst>
               <a:ext uri="{91240B29-F687-4f45-9708-019B960494DF}">
-                <a14:hiddenLine xmlns:a14="http://schemas.microsoft.com/office/drawing/2010/main" xmlns="" w="9525">
+                <a14:hiddenLine xmlns="" xmlns:a14="http://schemas.microsoft.com/office/drawing/2010/main" w="9525">
                   <a:solidFill>
                     <a:srgbClr val="000000"/>
                   </a:solidFill>
@@ -50893,7 +50668,7 @@
             </a:ln>
             <a:extLst>
               <a:ext uri="{91240B29-F687-4f45-9708-019B960494DF}">
-                <a14:hiddenLine xmlns:a14="http://schemas.microsoft.com/office/drawing/2010/main" xmlns="" w="9525">
+                <a14:hiddenLine xmlns="" xmlns:a14="http://schemas.microsoft.com/office/drawing/2010/main" w="9525">
                   <a:solidFill>
                     <a:srgbClr val="000000"/>
                   </a:solidFill>
@@ -51130,7 +50905,7 @@
             </a:ln>
             <a:extLst>
               <a:ext uri="{91240B29-F687-4f45-9708-019B960494DF}">
-                <a14:hiddenLine xmlns:a14="http://schemas.microsoft.com/office/drawing/2010/main" xmlns="" w="9525">
+                <a14:hiddenLine xmlns="" xmlns:a14="http://schemas.microsoft.com/office/drawing/2010/main" w="9525">
                   <a:solidFill>
                     <a:srgbClr val="000000"/>
                   </a:solidFill>
@@ -51753,7 +51528,7 @@
             </a:ln>
             <a:extLst>
               <a:ext uri="{91240B29-F687-4f45-9708-019B960494DF}">
-                <a14:hiddenLine xmlns:a14="http://schemas.microsoft.com/office/drawing/2010/main" xmlns="" w="9525">
+                <a14:hiddenLine xmlns="" xmlns:a14="http://schemas.microsoft.com/office/drawing/2010/main" w="9525">
                   <a:solidFill>
                     <a:srgbClr val="000000"/>
                   </a:solidFill>
@@ -52352,7 +52127,7 @@
             </a:ln>
             <a:extLst>
               <a:ext uri="{91240B29-F687-4f45-9708-019B960494DF}">
-                <a14:hiddenLine xmlns:a14="http://schemas.microsoft.com/office/drawing/2010/main" xmlns="" w="9525">
+                <a14:hiddenLine xmlns="" xmlns:a14="http://schemas.microsoft.com/office/drawing/2010/main" w="9525">
                   <a:solidFill>
                     <a:srgbClr val="000000"/>
                   </a:solidFill>
@@ -52951,7 +52726,7 @@
             </a:ln>
             <a:extLst>
               <a:ext uri="{91240B29-F687-4f45-9708-019B960494DF}">
-                <a14:hiddenLine xmlns:a14="http://schemas.microsoft.com/office/drawing/2010/main" xmlns="" w="9525">
+                <a14:hiddenLine xmlns="" xmlns:a14="http://schemas.microsoft.com/office/drawing/2010/main" w="9525">
                   <a:solidFill>
                     <a:srgbClr val="000000"/>
                   </a:solidFill>
@@ -53545,6 +53320,21 @@
 </file>
 
 <file path=customXml/item1.xml><?xml version="1.0" encoding="utf-8"?>
+<p:properties xmlns:p="http://schemas.microsoft.com/office/2006/metadata/properties" xmlns:xsi="http://www.w3.org/2001/XMLSchema-instance" xmlns:pc="http://schemas.microsoft.com/office/infopath/2007/PartnerControls">
+  <documentManagement/>
+</p:properties>
+</file>
+
+<file path=customXml/item2.xml><?xml version="1.0" encoding="utf-8"?>
+<?mso-contentType ?>
+<FormTemplates xmlns="http://schemas.microsoft.com/sharepoint/v3/contenttype/forms">
+  <Display>DocumentLibraryForm</Display>
+  <Edit>DocumentLibraryForm</Edit>
+  <New>DocumentLibraryForm</New>
+</FormTemplates>
+</file>
+
+<file path=customXml/item3.xml><?xml version="1.0" encoding="utf-8"?>
 <ct:contentTypeSchema xmlns:ct="http://schemas.microsoft.com/office/2006/metadata/contentType" xmlns:ma="http://schemas.microsoft.com/office/2006/metadata/properties/metaAttributes" ct:_="" ma:_="" ma:contentTypeName="Document" ma:contentTypeID="0x0101003CFE317AB703A0449742DE406C676985" ma:contentTypeVersion="" ma:contentTypeDescription="Create a new document." ma:contentTypeScope="" ma:versionID="075a0df9327dac238a362fa612ce7c78">
   <xsd:schema xmlns:xsd="http://www.w3.org/2001/XMLSchema" xmlns:xs="http://www.w3.org/2001/XMLSchema" xmlns:p="http://schemas.microsoft.com/office/2006/metadata/properties" xmlns:ns2="dfcad76c-8265-44a7-8256-4938e7b2ebda" xmlns:ns3="cb8bf1fc-3ac3-4ad2-bdcd-c166d58421a5" targetNamespace="http://schemas.microsoft.com/office/2006/metadata/properties" ma:root="true" ma:fieldsID="77d1d37617f2da2848f03c1ae57996a7" ns2:_="" ns3:_="">
     <xsd:import namespace="dfcad76c-8265-44a7-8256-4938e7b2ebda"/>
@@ -53729,22 +53519,24 @@
 </ct:contentTypeSchema>
 </file>
 
-<file path=customXml/item2.xml><?xml version="1.0" encoding="utf-8"?>
-<?mso-contentType ?>
-<FormTemplates xmlns="http://schemas.microsoft.com/sharepoint/v3/contenttype/forms">
-  <Display>DocumentLibraryForm</Display>
-  <Edit>DocumentLibraryForm</Edit>
-  <New>DocumentLibraryForm</New>
-</FormTemplates>
+<file path=customXml/itemProps1.xml><?xml version="1.0" encoding="utf-8"?>
+<ds:datastoreItem xmlns:ds="http://schemas.openxmlformats.org/officeDocument/2006/customXml" ds:itemID="{00903BAE-DDAE-402D-98CC-A6F112A5C05E}">
+  <ds:schemaRefs>
+    <ds:schemaRef ds:uri="http://schemas.microsoft.com/office/2006/metadata/properties"/>
+    <ds:schemaRef ds:uri="http://schemas.microsoft.com/office/infopath/2007/PartnerControls"/>
+  </ds:schemaRefs>
+</ds:datastoreItem>
 </file>
 
-<file path=customXml/item3.xml><?xml version="1.0" encoding="utf-8"?>
-<p:properties xmlns:p="http://schemas.microsoft.com/office/2006/metadata/properties" xmlns:xsi="http://www.w3.org/2001/XMLSchema-instance" xmlns:pc="http://schemas.microsoft.com/office/infopath/2007/PartnerControls">
-  <documentManagement/>
-</p:properties>
+<file path=customXml/itemProps2.xml><?xml version="1.0" encoding="utf-8"?>
+<ds:datastoreItem xmlns:ds="http://schemas.openxmlformats.org/officeDocument/2006/customXml" ds:itemID="{0BD97C68-B59E-41E1-B6CE-FF954F133065}">
+  <ds:schemaRefs>
+    <ds:schemaRef ds:uri="http://schemas.microsoft.com/sharepoint/v3/contenttype/forms"/>
+  </ds:schemaRefs>
+</ds:datastoreItem>
 </file>
 
-<file path=customXml/itemProps1.xml><?xml version="1.0" encoding="utf-8"?>
+<file path=customXml/itemProps3.xml><?xml version="1.0" encoding="utf-8"?>
 <ds:datastoreItem xmlns:ds="http://schemas.openxmlformats.org/officeDocument/2006/customXml" ds:itemID="{C19435C9-137C-432D-9CF9-8A130E755C7B}">
   <ds:schemaRefs>
     <ds:schemaRef ds:uri="http://schemas.microsoft.com/office/2006/metadata/contentType"/>
@@ -53761,21 +53553,4 @@
     <ds:schemaRef ds:uri="http://schemas.microsoft.com/internal/obd"/>
   </ds:schemaRefs>
 </ds:datastoreItem>
-</file>
-
-<file path=customXml/itemProps2.xml><?xml version="1.0" encoding="utf-8"?>
-<ds:datastoreItem xmlns:ds="http://schemas.openxmlformats.org/officeDocument/2006/customXml" ds:itemID="{0BD97C68-B59E-41E1-B6CE-FF954F133065}">
-  <ds:schemaRefs>
-    <ds:schemaRef ds:uri="http://schemas.microsoft.com/sharepoint/v3/contenttype/forms"/>
-  </ds:schemaRefs>
-</ds:datastoreItem>
-</file>
-
-<file path=customXml/itemProps3.xml><?xml version="1.0" encoding="utf-8"?>
-<ds:datastoreItem xmlns:ds="http://schemas.openxmlformats.org/officeDocument/2006/customXml" ds:itemID="{00903BAE-DDAE-402D-98CC-A6F112A5C05E}">
-  <ds:schemaRefs>
-    <ds:schemaRef ds:uri="http://schemas.microsoft.com/office/2006/metadata/properties"/>
-    <ds:schemaRef ds:uri="http://schemas.microsoft.com/office/infopath/2007/PartnerControls"/>
-  </ds:schemaRefs>
-</ds:datastoreItem>
 </file>
</xml_diff>